<commit_message>
Small changes to some slides
</commit_message>
<xml_diff>
--- a/challenges/fd_poision/FdOverwrite.pptx
+++ b/challenges/fd_poision/FdOverwrite.pptx
@@ -28,35 +28,35 @@
     <p:sldId id="454" r:id="rId19"/>
     <p:sldId id="447" r:id="rId20"/>
     <p:sldId id="446" r:id="rId21"/>
-    <p:sldId id="492" r:id="rId22"/>
-    <p:sldId id="499" r:id="rId23"/>
+    <p:sldId id="499" r:id="rId22"/>
+    <p:sldId id="492" r:id="rId23"/>
     <p:sldId id="493" r:id="rId24"/>
     <p:sldId id="494" r:id="rId25"/>
     <p:sldId id="495" r:id="rId26"/>
     <p:sldId id="497" r:id="rId27"/>
     <p:sldId id="498" r:id="rId28"/>
     <p:sldId id="500" r:id="rId29"/>
-    <p:sldId id="456" r:id="rId30"/>
-    <p:sldId id="455" r:id="rId31"/>
-    <p:sldId id="457" r:id="rId32"/>
-    <p:sldId id="458" r:id="rId33"/>
-    <p:sldId id="459" r:id="rId34"/>
-    <p:sldId id="463" r:id="rId35"/>
-    <p:sldId id="461" r:id="rId36"/>
-    <p:sldId id="462" r:id="rId37"/>
-    <p:sldId id="460" r:id="rId38"/>
-    <p:sldId id="464" r:id="rId39"/>
-    <p:sldId id="466" r:id="rId40"/>
-    <p:sldId id="465" r:id="rId41"/>
-    <p:sldId id="467" r:id="rId42"/>
-    <p:sldId id="468" r:id="rId43"/>
-    <p:sldId id="469" r:id="rId44"/>
-    <p:sldId id="470" r:id="rId45"/>
-    <p:sldId id="471" r:id="rId46"/>
-    <p:sldId id="473" r:id="rId47"/>
-    <p:sldId id="472" r:id="rId48"/>
-    <p:sldId id="474" r:id="rId49"/>
-    <p:sldId id="475" r:id="rId50"/>
+    <p:sldId id="473" r:id="rId30"/>
+    <p:sldId id="456" r:id="rId31"/>
+    <p:sldId id="455" r:id="rId32"/>
+    <p:sldId id="457" r:id="rId33"/>
+    <p:sldId id="458" r:id="rId34"/>
+    <p:sldId id="459" r:id="rId35"/>
+    <p:sldId id="463" r:id="rId36"/>
+    <p:sldId id="461" r:id="rId37"/>
+    <p:sldId id="462" r:id="rId38"/>
+    <p:sldId id="460" r:id="rId39"/>
+    <p:sldId id="464" r:id="rId40"/>
+    <p:sldId id="466" r:id="rId41"/>
+    <p:sldId id="465" r:id="rId42"/>
+    <p:sldId id="467" r:id="rId43"/>
+    <p:sldId id="468" r:id="rId44"/>
+    <p:sldId id="469" r:id="rId45"/>
+    <p:sldId id="470" r:id="rId46"/>
+    <p:sldId id="472" r:id="rId47"/>
+    <p:sldId id="474" r:id="rId48"/>
+    <p:sldId id="475" r:id="rId49"/>
+    <p:sldId id="501" r:id="rId50"/>
     <p:sldId id="484" r:id="rId51"/>
     <p:sldId id="491" r:id="rId52"/>
   </p:sldIdLst>
@@ -14924,7 +14924,7 @@
           <a:p>
             <a:fld id="{2DA23E8D-1792-1541-9147-970A8DD8A355}" type="datetimeFigureOut">
               <a:rPr lang="en-US" smtClean="0"/>
-              <a:t>2/11/21</a:t>
+              <a:t>2/15/21</a:t>
             </a:fld>
             <a:endParaRPr lang="en-US" dirty="0"/>
           </a:p>
@@ -15394,7 +15394,7 @@
                 <a:latin typeface="Calibri"/>
               </a:rPr>
               <a:pPr/>
-              <a:t>2/11/21</a:t>
+              <a:t>2/15/21</a:t>
             </a:fld>
             <a:endParaRPr lang="en-US" dirty="0">
               <a:solidFill>
@@ -15647,7 +15647,7 @@
                 <a:latin typeface="Calibri"/>
               </a:rPr>
               <a:pPr/>
-              <a:t>2/11/21</a:t>
+              <a:t>2/15/21</a:t>
             </a:fld>
             <a:endParaRPr lang="en-US" dirty="0">
               <a:solidFill>
@@ -15862,7 +15862,7 @@
                 <a:latin typeface="Calibri"/>
               </a:rPr>
               <a:pPr/>
-              <a:t>2/11/21</a:t>
+              <a:t>2/15/21</a:t>
             </a:fld>
             <a:endParaRPr lang="en-US" dirty="0">
               <a:solidFill>
@@ -16260,7 +16260,7 @@
                 <a:latin typeface="Calibri"/>
               </a:rPr>
               <a:pPr/>
-              <a:t>2/11/21</a:t>
+              <a:t>2/15/21</a:t>
             </a:fld>
             <a:endParaRPr lang="en-US" dirty="0">
               <a:solidFill>
@@ -16602,7 +16602,7 @@
                 <a:latin typeface="Calibri"/>
               </a:rPr>
               <a:pPr/>
-              <a:t>2/11/21</a:t>
+              <a:t>2/15/21</a:t>
             </a:fld>
             <a:endParaRPr lang="en-US" dirty="0">
               <a:solidFill>
@@ -16930,7 +16930,7 @@
                 <a:latin typeface="Calibri"/>
               </a:rPr>
               <a:pPr/>
-              <a:t>2/11/21</a:t>
+              <a:t>2/15/21</a:t>
             </a:fld>
             <a:endParaRPr lang="en-US" dirty="0">
               <a:solidFill>
@@ -17419,7 +17419,7 @@
                 <a:latin typeface="Calibri"/>
               </a:rPr>
               <a:pPr/>
-              <a:t>2/11/21</a:t>
+              <a:t>2/15/21</a:t>
             </a:fld>
             <a:endParaRPr lang="en-US" dirty="0">
               <a:solidFill>
@@ -17602,7 +17602,7 @@
                 <a:latin typeface="Calibri"/>
               </a:rPr>
               <a:pPr/>
-              <a:t>2/11/21</a:t>
+              <a:t>2/15/21</a:t>
             </a:fld>
             <a:endParaRPr lang="en-US" dirty="0">
               <a:solidFill>
@@ -17848,7 +17848,7 @@
                 <a:latin typeface="Calibri"/>
               </a:rPr>
               <a:pPr/>
-              <a:t>2/11/21</a:t>
+              <a:t>2/15/21</a:t>
             </a:fld>
             <a:endParaRPr lang="en-US" dirty="0">
               <a:solidFill>
@@ -18190,7 +18190,7 @@
                 <a:latin typeface="Calibri"/>
               </a:rPr>
               <a:pPr/>
-              <a:t>2/11/21</a:t>
+              <a:t>2/15/21</a:t>
             </a:fld>
             <a:endParaRPr lang="en-US" dirty="0">
               <a:solidFill>
@@ -18482,7 +18482,7 @@
                 <a:latin typeface="Calibri"/>
               </a:rPr>
               <a:pPr/>
-              <a:t>2/11/21</a:t>
+              <a:t>2/15/21</a:t>
             </a:fld>
             <a:endParaRPr lang="en-US" dirty="0">
               <a:solidFill>
@@ -18732,7 +18732,7 @@
                 <a:latin typeface="Calibri"/>
               </a:rPr>
               <a:pPr defTabSz="914400"/>
-              <a:t>2/11/21</a:t>
+              <a:t>2/15/21</a:t>
             </a:fld>
             <a:endParaRPr lang="en-US" dirty="0">
               <a:solidFill>
@@ -20963,8 +20963,8 @@
               <a:t> pointer of </a:t>
             </a:r>
             <a:r>
-              <a:rPr lang="en-US" i="1" dirty="0" err="1"/>
-              <a:t>Tcache</a:t>
+              <a:rPr lang="en-US" i="1" dirty="0"/>
+              <a:t>TCache</a:t>
             </a:r>
             <a:r>
               <a:rPr lang="en-US" dirty="0"/>
@@ -21201,7 +21201,9 @@
           </a:xfrm>
         </p:spPr>
         <p:txBody>
-          <a:bodyPr/>
+          <a:bodyPr>
+            <a:normAutofit/>
+          </a:bodyPr>
           <a:lstStyle/>
           <a:p>
             <a:r>
@@ -21219,6 +21221,13 @@
             <a:r>
               <a:rPr lang="en-US" i="1" dirty="0"/>
               <a:t>heap!)</a:t>
+            </a:r>
+          </a:p>
+          <a:p>
+            <a:pPr lvl="1"/>
+            <a:r>
+              <a:rPr lang="en-US" dirty="0"/>
+              <a:t>Not cleared when allocated</a:t>
             </a:r>
           </a:p>
           <a:p>
@@ -21800,7 +21809,7 @@
           <p:cNvPr id="2" name="Title 1">
             <a:extLst>
               <a:ext uri="{FF2B5EF4-FFF2-40B4-BE49-F238E27FC236}">
-                <a16:creationId xmlns:a16="http://schemas.microsoft.com/office/drawing/2014/main" id="{866ACC8C-7B4D-9A4D-9BCB-4EE61B5A1635}"/>
+                <a16:creationId xmlns:a16="http://schemas.microsoft.com/office/drawing/2014/main" id="{0DC0409E-33C4-1B4D-9536-E0B7126C7E32}"/>
               </a:ext>
             </a:extLst>
           </p:cNvPr>
@@ -21818,7 +21827,7 @@
           <a:p>
             <a:r>
               <a:rPr lang="en-US" dirty="0"/>
-              <a:t>Challenge 1</a:t>
+              <a:t>Debugging Tips - Commands</a:t>
             </a:r>
           </a:p>
         </p:txBody>
@@ -21828,7 +21837,7 @@
           <p:cNvPr id="3" name="Content Placeholder 2">
             <a:extLst>
               <a:ext uri="{FF2B5EF4-FFF2-40B4-BE49-F238E27FC236}">
-                <a16:creationId xmlns:a16="http://schemas.microsoft.com/office/drawing/2014/main" id="{A9B74886-7FA9-6045-94CE-4AC2E77B423D}"/>
+                <a16:creationId xmlns:a16="http://schemas.microsoft.com/office/drawing/2014/main" id="{9979A9B1-889A-EA45-88AD-18911539E0C4}"/>
               </a:ext>
             </a:extLst>
           </p:cNvPr>
@@ -21839,34 +21848,128 @@
             <p:ph idx="1"/>
           </p:nvPr>
         </p:nvSpPr>
-        <p:spPr/>
+        <p:spPr>
+          <a:xfrm>
+            <a:off x="628650" y="1236541"/>
+            <a:ext cx="7886700" cy="3805722"/>
+          </a:xfrm>
+        </p:spPr>
         <p:txBody>
-          <a:bodyPr/>
+          <a:bodyPr>
+            <a:normAutofit fontScale="85000" lnSpcReduction="20000"/>
+          </a:bodyPr>
           <a:lstStyle/>
           <a:p>
             <a:r>
+              <a:rPr lang="en-US" dirty="0"/>
+              <a:t>breakpoint  *malloc: </a:t>
+            </a:r>
+          </a:p>
+          <a:p>
+            <a:pPr lvl="1"/>
+            <a:r>
+              <a:rPr lang="en-US" dirty="0"/>
+              <a:t>Set a breakpoint at </a:t>
+            </a:r>
+            <a:r>
+              <a:rPr lang="en-US" b="1" dirty="0"/>
+              <a:t>malloc</a:t>
+            </a:r>
+          </a:p>
+          <a:p>
+            <a:pPr lvl="1"/>
+            <a:r>
+              <a:rPr lang="en-US" dirty="0"/>
+              <a:t>Look at what happens step by step</a:t>
+            </a:r>
+          </a:p>
+          <a:p>
+            <a:r>
+              <a:rPr lang="en-US" dirty="0"/>
+              <a:t>breakpoint *free: </a:t>
+            </a:r>
+          </a:p>
+          <a:p>
+            <a:pPr lvl="1"/>
+            <a:r>
+              <a:rPr lang="en-US" dirty="0"/>
+              <a:t>Set a breakpoint on </a:t>
+            </a:r>
+            <a:r>
+              <a:rPr lang="en-US" b="1" dirty="0"/>
+              <a:t>free</a:t>
+            </a:r>
+          </a:p>
+          <a:p>
+            <a:r>
+              <a:rPr lang="en-US" dirty="0"/>
+              <a:t>step (s): </a:t>
+            </a:r>
+          </a:p>
+          <a:p>
+            <a:pPr lvl="1"/>
+            <a:r>
+              <a:rPr lang="en-US" dirty="0"/>
+              <a:t>Step line by line</a:t>
+            </a:r>
+          </a:p>
+          <a:p>
+            <a:r>
+              <a:rPr lang="en-US" dirty="0"/>
+              <a:t>continue (c):</a:t>
+            </a:r>
+          </a:p>
+          <a:p>
+            <a:pPr lvl="1"/>
+            <a:r>
+              <a:rPr lang="en-US" dirty="0"/>
+              <a:t>Continue until next breakpoint</a:t>
+            </a:r>
+          </a:p>
+          <a:p>
+            <a:r>
+              <a:rPr lang="en-US" dirty="0"/>
+              <a:t>bins:</a:t>
+            </a:r>
+          </a:p>
+          <a:p>
+            <a:pPr lvl="1"/>
+            <a:r>
+              <a:rPr lang="en-US" dirty="0"/>
+              <a:t>View data in all of the bins</a:t>
+            </a:r>
+          </a:p>
+          <a:p>
+            <a:r>
               <a:rPr lang="en-US" dirty="0" err="1"/>
-              <a:t>fd_poision</a:t>
+              <a:t>tcache</a:t>
             </a:r>
             <a:r>
               <a:rPr lang="en-US" dirty="0"/>
-              <a:t>-&gt;challenge1</a:t>
-            </a:r>
-          </a:p>
-          <a:p>
+              <a:t>: </a:t>
+            </a:r>
+          </a:p>
+          <a:p>
+            <a:pPr lvl="1"/>
             <a:r>
               <a:rPr lang="en-US" dirty="0"/>
-              <a:t>Setup a fake chunk to overwrite a string</a:t>
-            </a:r>
-          </a:p>
-          <a:p>
+              <a:t>Specifically show the </a:t>
+            </a:r>
+            <a:r>
+              <a:rPr lang="en-US" i="1" dirty="0" err="1"/>
+              <a:t>tcache</a:t>
+            </a:r>
             <a:r>
               <a:rPr lang="en-US" dirty="0"/>
-              <a:t>String is at ﻿</a:t>
-            </a:r>
-            <a:r>
-              <a:rPr lang="en-US" b="1" dirty="0"/>
-              <a:t>0x601080</a:t>
+              <a:t> </a:t>
+            </a:r>
+            <a:r>
+              <a:rPr lang="en-US" i="1" dirty="0"/>
+              <a:t>bin</a:t>
+            </a:r>
+            <a:r>
+              <a:rPr lang="en-US" dirty="0"/>
+              <a:t> only</a:t>
             </a:r>
           </a:p>
         </p:txBody>
@@ -21874,7 +21977,7 @@
     </p:spTree>
     <p:extLst>
       <p:ext uri="{BB962C8B-B14F-4D97-AF65-F5344CB8AC3E}">
-        <p14:creationId xmlns:p14="http://schemas.microsoft.com/office/powerpoint/2010/main" val="3704577192"/>
+        <p14:creationId xmlns:p14="http://schemas.microsoft.com/office/powerpoint/2010/main" val="923231449"/>
       </p:ext>
     </p:extLst>
   </p:cSld>
@@ -21906,7 +22009,7 @@
           <p:cNvPr id="2" name="Title 1">
             <a:extLst>
               <a:ext uri="{FF2B5EF4-FFF2-40B4-BE49-F238E27FC236}">
-                <a16:creationId xmlns:a16="http://schemas.microsoft.com/office/drawing/2014/main" id="{0DC0409E-33C4-1B4D-9536-E0B7126C7E32}"/>
+                <a16:creationId xmlns:a16="http://schemas.microsoft.com/office/drawing/2014/main" id="{866ACC8C-7B4D-9A4D-9BCB-4EE61B5A1635}"/>
               </a:ext>
             </a:extLst>
           </p:cNvPr>
@@ -21924,7 +22027,7 @@
           <a:p>
             <a:r>
               <a:rPr lang="en-US" dirty="0"/>
-              <a:t>Debugging Tips - Commands</a:t>
+              <a:t>Challenge 1</a:t>
             </a:r>
           </a:p>
         </p:txBody>
@@ -21934,7 +22037,7 @@
           <p:cNvPr id="3" name="Content Placeholder 2">
             <a:extLst>
               <a:ext uri="{FF2B5EF4-FFF2-40B4-BE49-F238E27FC236}">
-                <a16:creationId xmlns:a16="http://schemas.microsoft.com/office/drawing/2014/main" id="{9979A9B1-889A-EA45-88AD-18911539E0C4}"/>
+                <a16:creationId xmlns:a16="http://schemas.microsoft.com/office/drawing/2014/main" id="{A9B74886-7FA9-6045-94CE-4AC2E77B423D}"/>
               </a:ext>
             </a:extLst>
           </p:cNvPr>
@@ -21945,128 +22048,34 @@
             <p:ph idx="1"/>
           </p:nvPr>
         </p:nvSpPr>
-        <p:spPr>
-          <a:xfrm>
-            <a:off x="628650" y="1236541"/>
-            <a:ext cx="7886700" cy="3805722"/>
-          </a:xfrm>
-        </p:spPr>
+        <p:spPr/>
         <p:txBody>
-          <a:bodyPr>
-            <a:normAutofit fontScale="85000" lnSpcReduction="20000"/>
-          </a:bodyPr>
+          <a:bodyPr/>
           <a:lstStyle/>
           <a:p>
             <a:r>
+              <a:rPr lang="en-US" dirty="0" err="1"/>
+              <a:t>fd_poison</a:t>
+            </a:r>
+            <a:r>
               <a:rPr lang="en-US" dirty="0"/>
-              <a:t>breakpoint  *malloc: </a:t>
-            </a:r>
-          </a:p>
-          <a:p>
-            <a:pPr lvl="1"/>
+              <a:t>-&gt;challenge1</a:t>
+            </a:r>
+          </a:p>
+          <a:p>
             <a:r>
               <a:rPr lang="en-US" dirty="0"/>
-              <a:t>Set a breakpoint at </a:t>
+              <a:t>Setup a fake chunk to overwrite a string</a:t>
+            </a:r>
+          </a:p>
+          <a:p>
+            <a:r>
+              <a:rPr lang="en-US" dirty="0"/>
+              <a:t>String is at ﻿</a:t>
             </a:r>
             <a:r>
               <a:rPr lang="en-US" b="1" dirty="0"/>
-              <a:t>malloc</a:t>
-            </a:r>
-          </a:p>
-          <a:p>
-            <a:pPr lvl="1"/>
-            <a:r>
-              <a:rPr lang="en-US" dirty="0"/>
-              <a:t>Look at what happens step by step</a:t>
-            </a:r>
-          </a:p>
-          <a:p>
-            <a:r>
-              <a:rPr lang="en-US" dirty="0"/>
-              <a:t>breakpoint *free: </a:t>
-            </a:r>
-          </a:p>
-          <a:p>
-            <a:pPr lvl="1"/>
-            <a:r>
-              <a:rPr lang="en-US" dirty="0"/>
-              <a:t>Set a breakpoint on </a:t>
-            </a:r>
-            <a:r>
-              <a:rPr lang="en-US" b="1" dirty="0"/>
-              <a:t>free</a:t>
-            </a:r>
-          </a:p>
-          <a:p>
-            <a:r>
-              <a:rPr lang="en-US" dirty="0"/>
-              <a:t>step (s): </a:t>
-            </a:r>
-          </a:p>
-          <a:p>
-            <a:pPr lvl="1"/>
-            <a:r>
-              <a:rPr lang="en-US" dirty="0"/>
-              <a:t>Step line by line</a:t>
-            </a:r>
-          </a:p>
-          <a:p>
-            <a:r>
-              <a:rPr lang="en-US" dirty="0"/>
-              <a:t>continue (c):</a:t>
-            </a:r>
-          </a:p>
-          <a:p>
-            <a:pPr lvl="1"/>
-            <a:r>
-              <a:rPr lang="en-US" dirty="0"/>
-              <a:t>Continue until next breakpoint</a:t>
-            </a:r>
-          </a:p>
-          <a:p>
-            <a:r>
-              <a:rPr lang="en-US" dirty="0"/>
-              <a:t>bins:</a:t>
-            </a:r>
-          </a:p>
-          <a:p>
-            <a:pPr lvl="1"/>
-            <a:r>
-              <a:rPr lang="en-US" dirty="0"/>
-              <a:t>View data in all of the bins</a:t>
-            </a:r>
-          </a:p>
-          <a:p>
-            <a:r>
-              <a:rPr lang="en-US" dirty="0" err="1"/>
-              <a:t>tcache</a:t>
-            </a:r>
-            <a:r>
-              <a:rPr lang="en-US" dirty="0"/>
-              <a:t>: </a:t>
-            </a:r>
-          </a:p>
-          <a:p>
-            <a:pPr lvl="1"/>
-            <a:r>
-              <a:rPr lang="en-US" dirty="0"/>
-              <a:t>Specifically show the </a:t>
-            </a:r>
-            <a:r>
-              <a:rPr lang="en-US" i="1" dirty="0" err="1"/>
-              <a:t>tcache</a:t>
-            </a:r>
-            <a:r>
-              <a:rPr lang="en-US" dirty="0"/>
-              <a:t> </a:t>
-            </a:r>
-            <a:r>
-              <a:rPr lang="en-US" i="1" dirty="0"/>
-              <a:t>bin</a:t>
-            </a:r>
-            <a:r>
-              <a:rPr lang="en-US" dirty="0"/>
-              <a:t> only</a:t>
+              <a:t>0x601080</a:t>
             </a:r>
           </a:p>
         </p:txBody>
@@ -22074,7 +22083,7 @@
     </p:spTree>
     <p:extLst>
       <p:ext uri="{BB962C8B-B14F-4D97-AF65-F5344CB8AC3E}">
-        <p14:creationId xmlns:p14="http://schemas.microsoft.com/office/powerpoint/2010/main" val="923231449"/>
+        <p14:creationId xmlns:p14="http://schemas.microsoft.com/office/powerpoint/2010/main" val="3704577192"/>
       </p:ext>
     </p:extLst>
   </p:cSld>
@@ -22833,7 +22842,7 @@
 </file>
 
 <file path=ppt/slides/slide28.xml><?xml version="1.0" encoding="utf-8"?>
-<p:sld xmlns:a="http://schemas.openxmlformats.org/drawingml/2006/main" xmlns:r="http://schemas.openxmlformats.org/officeDocument/2006/relationships" xmlns:p="http://schemas.openxmlformats.org/presentationml/2006/main">
+<p:sld xmlns:a="http://schemas.openxmlformats.org/drawingml/2006/main" xmlns:r="http://schemas.openxmlformats.org/officeDocument/2006/relationships" xmlns:p="http://schemas.openxmlformats.org/presentationml/2006/main" show="0">
   <p:cSld>
     <p:spTree>
       <p:nvGrpSpPr>
@@ -22973,7 +22982,227 @@
 </file>
 
 <file path=ppt/slides/slide29.xml><?xml version="1.0" encoding="utf-8"?>
+<p:sld xmlns:a="http://schemas.openxmlformats.org/drawingml/2006/main" xmlns:r="http://schemas.openxmlformats.org/officeDocument/2006/relationships" xmlns:p="http://schemas.openxmlformats.org/presentationml/2006/main" show="0">
+  <p:cSld>
+    <p:spTree>
+      <p:nvGrpSpPr>
+        <p:cNvPr id="1" name=""/>
+        <p:cNvGrpSpPr/>
+        <p:nvPr/>
+      </p:nvGrpSpPr>
+      <p:grpSpPr>
+        <a:xfrm>
+          <a:off x="0" y="0"/>
+          <a:ext cx="0" cy="0"/>
+          <a:chOff x="0" y="0"/>
+          <a:chExt cx="0" cy="0"/>
+        </a:xfrm>
+      </p:grpSpPr>
+      <p:sp>
+        <p:nvSpPr>
+          <p:cNvPr id="2" name="Title 1">
+            <a:extLst>
+              <a:ext uri="{FF2B5EF4-FFF2-40B4-BE49-F238E27FC236}">
+                <a16:creationId xmlns:a16="http://schemas.microsoft.com/office/drawing/2014/main" id="{49C5C544-7A79-4948-930E-3F325F194F9A}"/>
+              </a:ext>
+            </a:extLst>
+          </p:cNvPr>
+          <p:cNvSpPr>
+            <a:spLocks noGrp="1"/>
+          </p:cNvSpPr>
+          <p:nvPr>
+            <p:ph type="title"/>
+          </p:nvPr>
+        </p:nvSpPr>
+        <p:spPr/>
+        <p:txBody>
+          <a:bodyPr/>
+          <a:lstStyle/>
+          <a:p>
+            <a:r>
+              <a:rPr lang="en-US" dirty="0" err="1"/>
+              <a:t>Pwntools</a:t>
+            </a:r>
+            <a:r>
+              <a:rPr lang="en-US" dirty="0"/>
+              <a:t> (Packing)</a:t>
+            </a:r>
+          </a:p>
+        </p:txBody>
+      </p:sp>
+      <p:sp>
+        <p:nvSpPr>
+          <p:cNvPr id="3" name="Content Placeholder 2">
+            <a:extLst>
+              <a:ext uri="{FF2B5EF4-FFF2-40B4-BE49-F238E27FC236}">
+                <a16:creationId xmlns:a16="http://schemas.microsoft.com/office/drawing/2014/main" id="{6A51F9B0-6FAF-4541-BAD3-E3AA65ECBF2B}"/>
+              </a:ext>
+            </a:extLst>
+          </p:cNvPr>
+          <p:cNvSpPr>
+            <a:spLocks noGrp="1"/>
+          </p:cNvSpPr>
+          <p:nvPr>
+            <p:ph idx="1"/>
+          </p:nvPr>
+        </p:nvSpPr>
+        <p:spPr/>
+        <p:txBody>
+          <a:bodyPr/>
+          <a:lstStyle/>
+          <a:p>
+            <a:r>
+              <a:rPr lang="en-US" dirty="0"/>
+              <a:t>p64(address): </a:t>
+            </a:r>
+          </a:p>
+          <a:p>
+            <a:pPr lvl="1"/>
+            <a:r>
+              <a:rPr lang="en-US" dirty="0"/>
+              <a:t>Will put ‘expected’ value into memory</a:t>
+            </a:r>
+          </a:p>
+          <a:p>
+            <a:r>
+              <a:rPr lang="en-US" dirty="0"/>
+              <a:t>Changes the endianness (little vs. big) </a:t>
+            </a:r>
+          </a:p>
+          <a:p>
+            <a:r>
+              <a:rPr lang="en-US" dirty="0"/>
+              <a:t>Turns into ‘bytes’</a:t>
+            </a:r>
+          </a:p>
+        </p:txBody>
+      </p:sp>
+    </p:spTree>
+    <p:extLst>
+      <p:ext uri="{BB962C8B-B14F-4D97-AF65-F5344CB8AC3E}">
+        <p14:creationId xmlns:p14="http://schemas.microsoft.com/office/powerpoint/2010/main" val="134052906"/>
+      </p:ext>
+    </p:extLst>
+  </p:cSld>
+  <p:clrMapOvr>
+    <a:masterClrMapping/>
+  </p:clrMapOvr>
+</p:sld>
+</file>
+
+<file path=ppt/slides/slide3.xml><?xml version="1.0" encoding="utf-8"?>
 <p:sld xmlns:a="http://schemas.openxmlformats.org/drawingml/2006/main" xmlns:r="http://schemas.openxmlformats.org/officeDocument/2006/relationships" xmlns:p="http://schemas.openxmlformats.org/presentationml/2006/main">
+  <p:cSld>
+    <p:spTree>
+      <p:nvGrpSpPr>
+        <p:cNvPr id="1" name=""/>
+        <p:cNvGrpSpPr/>
+        <p:nvPr/>
+      </p:nvGrpSpPr>
+      <p:grpSpPr>
+        <a:xfrm>
+          <a:off x="0" y="0"/>
+          <a:ext cx="0" cy="0"/>
+          <a:chOff x="0" y="0"/>
+          <a:chExt cx="0" cy="0"/>
+        </a:xfrm>
+      </p:grpSpPr>
+      <p:sp>
+        <p:nvSpPr>
+          <p:cNvPr id="2" name="Title 1">
+            <a:extLst>
+              <a:ext uri="{FF2B5EF4-FFF2-40B4-BE49-F238E27FC236}">
+                <a16:creationId xmlns:a16="http://schemas.microsoft.com/office/drawing/2014/main" id="{2D2415A4-FA59-A441-96A4-63062DAB71D9}"/>
+              </a:ext>
+            </a:extLst>
+          </p:cNvPr>
+          <p:cNvSpPr>
+            <a:spLocks noGrp="1"/>
+          </p:cNvSpPr>
+          <p:nvPr>
+            <p:ph type="title"/>
+          </p:nvPr>
+        </p:nvSpPr>
+        <p:spPr/>
+        <p:txBody>
+          <a:bodyPr/>
+          <a:lstStyle/>
+          <a:p>
+            <a:r>
+              <a:rPr lang="en-US" dirty="0"/>
+              <a:t>Overview</a:t>
+            </a:r>
+          </a:p>
+        </p:txBody>
+      </p:sp>
+      <p:sp>
+        <p:nvSpPr>
+          <p:cNvPr id="3" name="Content Placeholder 2">
+            <a:extLst>
+              <a:ext uri="{FF2B5EF4-FFF2-40B4-BE49-F238E27FC236}">
+                <a16:creationId xmlns:a16="http://schemas.microsoft.com/office/drawing/2014/main" id="{1D2F1DE9-E958-4D4B-9717-6AA1827E8A4A}"/>
+              </a:ext>
+            </a:extLst>
+          </p:cNvPr>
+          <p:cNvSpPr>
+            <a:spLocks noGrp="1"/>
+          </p:cNvSpPr>
+          <p:nvPr>
+            <p:ph idx="1"/>
+          </p:nvPr>
+        </p:nvSpPr>
+        <p:spPr>
+          <a:xfrm>
+            <a:off x="628650" y="1236541"/>
+            <a:ext cx="4458255" cy="3263504"/>
+          </a:xfrm>
+        </p:spPr>
+        <p:txBody>
+          <a:bodyPr/>
+          <a:lstStyle/>
+          <a:p>
+            <a:r>
+              <a:rPr lang="en-US" dirty="0"/>
+              <a:t>Bread &amp; Butter Technique </a:t>
+            </a:r>
+          </a:p>
+          <a:p>
+            <a:r>
+              <a:rPr lang="en-US" dirty="0"/>
+              <a:t>Corrupting singly linked list (TCache and </a:t>
+            </a:r>
+            <a:r>
+              <a:rPr lang="en-US" dirty="0" err="1"/>
+              <a:t>Fastbins</a:t>
+            </a:r>
+            <a:r>
+              <a:rPr lang="en-US" dirty="0"/>
+              <a:t>) </a:t>
+            </a:r>
+          </a:p>
+          <a:p>
+            <a:r>
+              <a:rPr lang="en-US" dirty="0"/>
+              <a:t>Create chunk almost anywhere!</a:t>
+            </a:r>
+          </a:p>
+        </p:txBody>
+      </p:sp>
+    </p:spTree>
+    <p:extLst>
+      <p:ext uri="{BB962C8B-B14F-4D97-AF65-F5344CB8AC3E}">
+        <p14:creationId xmlns:p14="http://schemas.microsoft.com/office/powerpoint/2010/main" val="2530545686"/>
+      </p:ext>
+    </p:extLst>
+  </p:cSld>
+  <p:clrMapOvr>
+    <a:masterClrMapping/>
+  </p:clrMapOvr>
+</p:sld>
+</file>
+
+<file path=ppt/slides/slide30.xml><?xml version="1.0" encoding="utf-8"?>
+<p:sld xmlns:a="http://schemas.openxmlformats.org/drawingml/2006/main" xmlns:r="http://schemas.openxmlformats.org/officeDocument/2006/relationships" xmlns:p="http://schemas.openxmlformats.org/presentationml/2006/main" show="0">
   <p:cSld>
     <p:spTree>
       <p:nvGrpSpPr>
@@ -23068,127 +23297,8 @@
 </p:sld>
 </file>
 
-<file path=ppt/slides/slide3.xml><?xml version="1.0" encoding="utf-8"?>
-<p:sld xmlns:a="http://schemas.openxmlformats.org/drawingml/2006/main" xmlns:r="http://schemas.openxmlformats.org/officeDocument/2006/relationships" xmlns:p="http://schemas.openxmlformats.org/presentationml/2006/main">
-  <p:cSld>
-    <p:spTree>
-      <p:nvGrpSpPr>
-        <p:cNvPr id="1" name=""/>
-        <p:cNvGrpSpPr/>
-        <p:nvPr/>
-      </p:nvGrpSpPr>
-      <p:grpSpPr>
-        <a:xfrm>
-          <a:off x="0" y="0"/>
-          <a:ext cx="0" cy="0"/>
-          <a:chOff x="0" y="0"/>
-          <a:chExt cx="0" cy="0"/>
-        </a:xfrm>
-      </p:grpSpPr>
-      <p:sp>
-        <p:nvSpPr>
-          <p:cNvPr id="2" name="Title 1">
-            <a:extLst>
-              <a:ext uri="{FF2B5EF4-FFF2-40B4-BE49-F238E27FC236}">
-                <a16:creationId xmlns:a16="http://schemas.microsoft.com/office/drawing/2014/main" id="{2D2415A4-FA59-A441-96A4-63062DAB71D9}"/>
-              </a:ext>
-            </a:extLst>
-          </p:cNvPr>
-          <p:cNvSpPr>
-            <a:spLocks noGrp="1"/>
-          </p:cNvSpPr>
-          <p:nvPr>
-            <p:ph type="title"/>
-          </p:nvPr>
-        </p:nvSpPr>
-        <p:spPr/>
-        <p:txBody>
-          <a:bodyPr/>
-          <a:lstStyle/>
-          <a:p>
-            <a:r>
-              <a:rPr lang="en-US" dirty="0"/>
-              <a:t>Overview</a:t>
-            </a:r>
-          </a:p>
-        </p:txBody>
-      </p:sp>
-      <p:sp>
-        <p:nvSpPr>
-          <p:cNvPr id="3" name="Content Placeholder 2">
-            <a:extLst>
-              <a:ext uri="{FF2B5EF4-FFF2-40B4-BE49-F238E27FC236}">
-                <a16:creationId xmlns:a16="http://schemas.microsoft.com/office/drawing/2014/main" id="{1D2F1DE9-E958-4D4B-9717-6AA1827E8A4A}"/>
-              </a:ext>
-            </a:extLst>
-          </p:cNvPr>
-          <p:cNvSpPr>
-            <a:spLocks noGrp="1"/>
-          </p:cNvSpPr>
-          <p:nvPr>
-            <p:ph idx="1"/>
-          </p:nvPr>
-        </p:nvSpPr>
-        <p:spPr>
-          <a:xfrm>
-            <a:off x="628650" y="1236541"/>
-            <a:ext cx="4458255" cy="3263504"/>
-          </a:xfrm>
-        </p:spPr>
-        <p:txBody>
-          <a:bodyPr/>
-          <a:lstStyle/>
-          <a:p>
-            <a:r>
-              <a:rPr lang="en-US" dirty="0"/>
-              <a:t>Bread &amp; Butter Technique </a:t>
-            </a:r>
-          </a:p>
-          <a:p>
-            <a:r>
-              <a:rPr lang="en-US" dirty="0"/>
-              <a:t>Corrupting singly linked list (</a:t>
-            </a:r>
-            <a:r>
-              <a:rPr lang="en-US" dirty="0" err="1"/>
-              <a:t>tcache</a:t>
-            </a:r>
-            <a:r>
-              <a:rPr lang="en-US" dirty="0"/>
-              <a:t> and </a:t>
-            </a:r>
-            <a:r>
-              <a:rPr lang="en-US" dirty="0" err="1"/>
-              <a:t>fastbins</a:t>
-            </a:r>
-            <a:r>
-              <a:rPr lang="en-US" dirty="0"/>
-              <a:t>) </a:t>
-            </a:r>
-          </a:p>
-          <a:p>
-            <a:r>
-              <a:rPr lang="en-US" dirty="0"/>
-              <a:t>Create chunk almost anywhere!</a:t>
-            </a:r>
-          </a:p>
-        </p:txBody>
-      </p:sp>
-    </p:spTree>
-    <p:extLst>
-      <p:ext uri="{BB962C8B-B14F-4D97-AF65-F5344CB8AC3E}">
-        <p14:creationId xmlns:p14="http://schemas.microsoft.com/office/powerpoint/2010/main" val="2530545686"/>
-      </p:ext>
-    </p:extLst>
-  </p:cSld>
-  <p:clrMapOvr>
-    <a:masterClrMapping/>
-  </p:clrMapOvr>
-</p:sld>
-</file>
-
-<file path=ppt/slides/slide30.xml><?xml version="1.0" encoding="utf-8"?>
-<p:sld xmlns:a="http://schemas.openxmlformats.org/drawingml/2006/main" xmlns:r="http://schemas.openxmlformats.org/officeDocument/2006/relationships" xmlns:p="http://schemas.openxmlformats.org/presentationml/2006/main">
+<file path=ppt/slides/slide31.xml><?xml version="1.0" encoding="utf-8"?>
+<p:sld xmlns:a="http://schemas.openxmlformats.org/drawingml/2006/main" xmlns:r="http://schemas.openxmlformats.org/officeDocument/2006/relationships" xmlns:p="http://schemas.openxmlformats.org/presentationml/2006/main" show="0">
   <p:cSld>
     <p:spTree>
       <p:nvGrpSpPr>
@@ -23283,8 +23393,8 @@
 </p:sld>
 </file>
 
-<file path=ppt/slides/slide31.xml><?xml version="1.0" encoding="utf-8"?>
-<p:sld xmlns:a="http://schemas.openxmlformats.org/drawingml/2006/main" xmlns:r="http://schemas.openxmlformats.org/officeDocument/2006/relationships" xmlns:p="http://schemas.openxmlformats.org/presentationml/2006/main">
+<file path=ppt/slides/slide32.xml><?xml version="1.0" encoding="utf-8"?>
+<p:sld xmlns:a="http://schemas.openxmlformats.org/drawingml/2006/main" xmlns:r="http://schemas.openxmlformats.org/officeDocument/2006/relationships" xmlns:p="http://schemas.openxmlformats.org/presentationml/2006/main" show="0">
   <p:cSld>
     <p:spTree>
       <p:nvGrpSpPr>
@@ -23431,8 +23541,8 @@
 </p:sld>
 </file>
 
-<file path=ppt/slides/slide32.xml><?xml version="1.0" encoding="utf-8"?>
-<p:sld xmlns:a="http://schemas.openxmlformats.org/drawingml/2006/main" xmlns:r="http://schemas.openxmlformats.org/officeDocument/2006/relationships" xmlns:p="http://schemas.openxmlformats.org/presentationml/2006/main">
+<file path=ppt/slides/slide33.xml><?xml version="1.0" encoding="utf-8"?>
+<p:sld xmlns:a="http://schemas.openxmlformats.org/drawingml/2006/main" xmlns:r="http://schemas.openxmlformats.org/officeDocument/2006/relationships" xmlns:p="http://schemas.openxmlformats.org/presentationml/2006/main" show="0">
   <p:cSld>
     <p:spTree>
       <p:nvGrpSpPr>
@@ -23632,8 +23742,8 @@
 </p:sld>
 </file>
 
-<file path=ppt/slides/slide33.xml><?xml version="1.0" encoding="utf-8"?>
-<p:sld xmlns:a="http://schemas.openxmlformats.org/drawingml/2006/main" xmlns:r="http://schemas.openxmlformats.org/officeDocument/2006/relationships" xmlns:p="http://schemas.openxmlformats.org/presentationml/2006/main">
+<file path=ppt/slides/slide34.xml><?xml version="1.0" encoding="utf-8"?>
+<p:sld xmlns:a="http://schemas.openxmlformats.org/drawingml/2006/main" xmlns:r="http://schemas.openxmlformats.org/officeDocument/2006/relationships" xmlns:p="http://schemas.openxmlformats.org/presentationml/2006/main" show="0">
   <p:cSld>
     <p:spTree>
       <p:nvGrpSpPr>
@@ -23823,8 +23933,8 @@
 </p:sld>
 </file>
 
-<file path=ppt/slides/slide34.xml><?xml version="1.0" encoding="utf-8"?>
-<p:sld xmlns:a="http://schemas.openxmlformats.org/drawingml/2006/main" xmlns:r="http://schemas.openxmlformats.org/officeDocument/2006/relationships" xmlns:p="http://schemas.openxmlformats.org/presentationml/2006/main">
+<file path=ppt/slides/slide35.xml><?xml version="1.0" encoding="utf-8"?>
+<p:sld xmlns:a="http://schemas.openxmlformats.org/drawingml/2006/main" xmlns:r="http://schemas.openxmlformats.org/officeDocument/2006/relationships" xmlns:p="http://schemas.openxmlformats.org/presentationml/2006/main" show="0">
   <p:cSld>
     <p:spTree>
       <p:nvGrpSpPr>
@@ -24189,8 +24299,8 @@
 </p:sld>
 </file>
 
-<file path=ppt/slides/slide35.xml><?xml version="1.0" encoding="utf-8"?>
-<p:sld xmlns:a="http://schemas.openxmlformats.org/drawingml/2006/main" xmlns:r="http://schemas.openxmlformats.org/officeDocument/2006/relationships" xmlns:p="http://schemas.openxmlformats.org/presentationml/2006/main">
+<file path=ppt/slides/slide36.xml><?xml version="1.0" encoding="utf-8"?>
+<p:sld xmlns:a="http://schemas.openxmlformats.org/drawingml/2006/main" xmlns:r="http://schemas.openxmlformats.org/officeDocument/2006/relationships" xmlns:p="http://schemas.openxmlformats.org/presentationml/2006/main" show="0">
   <p:cSld>
     <p:spTree>
       <p:nvGrpSpPr>
@@ -24491,8 +24601,8 @@
 </p:sld>
 </file>
 
-<file path=ppt/slides/slide36.xml><?xml version="1.0" encoding="utf-8"?>
-<p:sld xmlns:a="http://schemas.openxmlformats.org/drawingml/2006/main" xmlns:r="http://schemas.openxmlformats.org/officeDocument/2006/relationships" xmlns:p="http://schemas.openxmlformats.org/presentationml/2006/main">
+<file path=ppt/slides/slide37.xml><?xml version="1.0" encoding="utf-8"?>
+<p:sld xmlns:a="http://schemas.openxmlformats.org/drawingml/2006/main" xmlns:r="http://schemas.openxmlformats.org/officeDocument/2006/relationships" xmlns:p="http://schemas.openxmlformats.org/presentationml/2006/main" show="0">
   <p:cSld>
     <p:spTree>
       <p:nvGrpSpPr>
@@ -24797,8 +24907,8 @@
 </p:sld>
 </file>
 
-<file path=ppt/slides/slide37.xml><?xml version="1.0" encoding="utf-8"?>
-<p:sld xmlns:a="http://schemas.openxmlformats.org/drawingml/2006/main" xmlns:r="http://schemas.openxmlformats.org/officeDocument/2006/relationships" xmlns:p="http://schemas.openxmlformats.org/presentationml/2006/main">
+<file path=ppt/slides/slide38.xml><?xml version="1.0" encoding="utf-8"?>
+<p:sld xmlns:a="http://schemas.openxmlformats.org/drawingml/2006/main" xmlns:r="http://schemas.openxmlformats.org/officeDocument/2006/relationships" xmlns:p="http://schemas.openxmlformats.org/presentationml/2006/main" show="0">
   <p:cSld>
     <p:spTree>
       <p:nvGrpSpPr>
@@ -24983,8 +25093,8 @@
 </p:sld>
 </file>
 
-<file path=ppt/slides/slide38.xml><?xml version="1.0" encoding="utf-8"?>
-<p:sld xmlns:a="http://schemas.openxmlformats.org/drawingml/2006/main" xmlns:r="http://schemas.openxmlformats.org/officeDocument/2006/relationships" xmlns:p="http://schemas.openxmlformats.org/presentationml/2006/main">
+<file path=ppt/slides/slide39.xml><?xml version="1.0" encoding="utf-8"?>
+<p:sld xmlns:a="http://schemas.openxmlformats.org/drawingml/2006/main" xmlns:r="http://schemas.openxmlformats.org/officeDocument/2006/relationships" xmlns:p="http://schemas.openxmlformats.org/presentationml/2006/main" show="0">
   <p:cSld>
     <p:spTree>
       <p:nvGrpSpPr>
@@ -25079,8 +25189,137 @@
 </p:sld>
 </file>
 
-<file path=ppt/slides/slide39.xml><?xml version="1.0" encoding="utf-8"?>
+<file path=ppt/slides/slide4.xml><?xml version="1.0" encoding="utf-8"?>
 <p:sld xmlns:a="http://schemas.openxmlformats.org/drawingml/2006/main" xmlns:r="http://schemas.openxmlformats.org/officeDocument/2006/relationships" xmlns:p="http://schemas.openxmlformats.org/presentationml/2006/main">
+  <p:cSld>
+    <p:spTree>
+      <p:nvGrpSpPr>
+        <p:cNvPr id="1" name=""/>
+        <p:cNvGrpSpPr/>
+        <p:nvPr/>
+      </p:nvGrpSpPr>
+      <p:grpSpPr>
+        <a:xfrm>
+          <a:off x="0" y="0"/>
+          <a:ext cx="0" cy="0"/>
+          <a:chOff x="0" y="0"/>
+          <a:chExt cx="0" cy="0"/>
+        </a:xfrm>
+      </p:grpSpPr>
+      <p:sp>
+        <p:nvSpPr>
+          <p:cNvPr id="2" name="Title 1">
+            <a:extLst>
+              <a:ext uri="{FF2B5EF4-FFF2-40B4-BE49-F238E27FC236}">
+                <a16:creationId xmlns:a16="http://schemas.microsoft.com/office/drawing/2014/main" id="{D3226B31-8E27-9B42-BD86-BB21545EE327}"/>
+              </a:ext>
+            </a:extLst>
+          </p:cNvPr>
+          <p:cNvSpPr>
+            <a:spLocks noGrp="1"/>
+          </p:cNvSpPr>
+          <p:nvPr>
+            <p:ph type="title"/>
+          </p:nvPr>
+        </p:nvSpPr>
+        <p:spPr/>
+        <p:txBody>
+          <a:bodyPr/>
+          <a:lstStyle/>
+          <a:p>
+            <a:r>
+              <a:rPr lang="en-US" dirty="0"/>
+              <a:t>Three Sections</a:t>
+            </a:r>
+          </a:p>
+        </p:txBody>
+      </p:sp>
+      <p:sp>
+        <p:nvSpPr>
+          <p:cNvPr id="3" name="Content Placeholder 2">
+            <a:extLst>
+              <a:ext uri="{FF2B5EF4-FFF2-40B4-BE49-F238E27FC236}">
+                <a16:creationId xmlns:a16="http://schemas.microsoft.com/office/drawing/2014/main" id="{74482978-8512-934C-89F9-3C551896ECDF}"/>
+              </a:ext>
+            </a:extLst>
+          </p:cNvPr>
+          <p:cNvSpPr>
+            <a:spLocks noGrp="1"/>
+          </p:cNvSpPr>
+          <p:nvPr>
+            <p:ph idx="1"/>
+          </p:nvPr>
+        </p:nvSpPr>
+        <p:spPr/>
+        <p:txBody>
+          <a:bodyPr/>
+          <a:lstStyle/>
+          <a:p>
+            <a:r>
+              <a:rPr lang="en-US" b="1" dirty="0"/>
+              <a:t>TCache (No Validations) </a:t>
+            </a:r>
+            <a:r>
+              <a:rPr lang="en-US" b="1" dirty="0">
+                <a:sym typeface="Wingdings" pitchFamily="2" charset="2"/>
+              </a:rPr>
+              <a:t> </a:t>
+            </a:r>
+            <a:r>
+              <a:rPr lang="en-US" dirty="0">
+                <a:sym typeface="Wingdings" pitchFamily="2" charset="2"/>
+              </a:rPr>
+              <a:t>Right now</a:t>
+            </a:r>
+            <a:endParaRPr lang="en-US" dirty="0"/>
+          </a:p>
+          <a:p>
+            <a:r>
+              <a:rPr lang="en-US" dirty="0" err="1"/>
+              <a:t>Fastbin</a:t>
+            </a:r>
+            <a:r>
+              <a:rPr lang="en-US" dirty="0"/>
+              <a:t> (Very few Validations) </a:t>
+            </a:r>
+          </a:p>
+          <a:p>
+            <a:r>
+              <a:rPr lang="en-US" dirty="0"/>
+              <a:t>2.32+</a:t>
+            </a:r>
+          </a:p>
+          <a:p>
+            <a:pPr lvl="1"/>
+            <a:r>
+              <a:rPr lang="en-US" dirty="0"/>
+              <a:t>Pointer Mangling (later) </a:t>
+            </a:r>
+          </a:p>
+          <a:p>
+            <a:pPr lvl="1"/>
+            <a:r>
+              <a:rPr lang="en-US" dirty="0"/>
+              <a:t>Chunk alignment</a:t>
+            </a:r>
+          </a:p>
+        </p:txBody>
+      </p:sp>
+    </p:spTree>
+    <p:extLst>
+      <p:ext uri="{BB962C8B-B14F-4D97-AF65-F5344CB8AC3E}">
+        <p14:creationId xmlns:p14="http://schemas.microsoft.com/office/powerpoint/2010/main" val="1887160673"/>
+      </p:ext>
+    </p:extLst>
+  </p:cSld>
+  <p:clrMapOvr>
+    <a:masterClrMapping/>
+  </p:clrMapOvr>
+</p:sld>
+</file>
+
+<file path=ppt/slides/slide40.xml><?xml version="1.0" encoding="utf-8"?>
+<p:sld xmlns:a="http://schemas.openxmlformats.org/drawingml/2006/main" xmlns:r="http://schemas.openxmlformats.org/officeDocument/2006/relationships" xmlns:p="http://schemas.openxmlformats.org/presentationml/2006/main" show="0">
   <p:cSld>
     <p:spTree>
       <p:nvGrpSpPr>
@@ -25175,137 +25414,8 @@
 </p:sld>
 </file>
 
-<file path=ppt/slides/slide4.xml><?xml version="1.0" encoding="utf-8"?>
-<p:sld xmlns:a="http://schemas.openxmlformats.org/drawingml/2006/main" xmlns:r="http://schemas.openxmlformats.org/officeDocument/2006/relationships" xmlns:p="http://schemas.openxmlformats.org/presentationml/2006/main">
-  <p:cSld>
-    <p:spTree>
-      <p:nvGrpSpPr>
-        <p:cNvPr id="1" name=""/>
-        <p:cNvGrpSpPr/>
-        <p:nvPr/>
-      </p:nvGrpSpPr>
-      <p:grpSpPr>
-        <a:xfrm>
-          <a:off x="0" y="0"/>
-          <a:ext cx="0" cy="0"/>
-          <a:chOff x="0" y="0"/>
-          <a:chExt cx="0" cy="0"/>
-        </a:xfrm>
-      </p:grpSpPr>
-      <p:sp>
-        <p:nvSpPr>
-          <p:cNvPr id="2" name="Title 1">
-            <a:extLst>
-              <a:ext uri="{FF2B5EF4-FFF2-40B4-BE49-F238E27FC236}">
-                <a16:creationId xmlns:a16="http://schemas.microsoft.com/office/drawing/2014/main" id="{D3226B31-8E27-9B42-BD86-BB21545EE327}"/>
-              </a:ext>
-            </a:extLst>
-          </p:cNvPr>
-          <p:cNvSpPr>
-            <a:spLocks noGrp="1"/>
-          </p:cNvSpPr>
-          <p:nvPr>
-            <p:ph type="title"/>
-          </p:nvPr>
-        </p:nvSpPr>
-        <p:spPr/>
-        <p:txBody>
-          <a:bodyPr/>
-          <a:lstStyle/>
-          <a:p>
-            <a:r>
-              <a:rPr lang="en-US" dirty="0"/>
-              <a:t>Three Sections</a:t>
-            </a:r>
-          </a:p>
-        </p:txBody>
-      </p:sp>
-      <p:sp>
-        <p:nvSpPr>
-          <p:cNvPr id="3" name="Content Placeholder 2">
-            <a:extLst>
-              <a:ext uri="{FF2B5EF4-FFF2-40B4-BE49-F238E27FC236}">
-                <a16:creationId xmlns:a16="http://schemas.microsoft.com/office/drawing/2014/main" id="{74482978-8512-934C-89F9-3C551896ECDF}"/>
-              </a:ext>
-            </a:extLst>
-          </p:cNvPr>
-          <p:cNvSpPr>
-            <a:spLocks noGrp="1"/>
-          </p:cNvSpPr>
-          <p:nvPr>
-            <p:ph idx="1"/>
-          </p:nvPr>
-        </p:nvSpPr>
-        <p:spPr/>
-        <p:txBody>
-          <a:bodyPr/>
-          <a:lstStyle/>
-          <a:p>
-            <a:r>
-              <a:rPr lang="en-US" b="1" dirty="0"/>
-              <a:t>TCache (No Validations) </a:t>
-            </a:r>
-            <a:r>
-              <a:rPr lang="en-US" b="1" dirty="0">
-                <a:sym typeface="Wingdings" pitchFamily="2" charset="2"/>
-              </a:rPr>
-              <a:t> </a:t>
-            </a:r>
-            <a:r>
-              <a:rPr lang="en-US" dirty="0">
-                <a:sym typeface="Wingdings" pitchFamily="2" charset="2"/>
-              </a:rPr>
-              <a:t>Right now</a:t>
-            </a:r>
-            <a:endParaRPr lang="en-US" dirty="0"/>
-          </a:p>
-          <a:p>
-            <a:r>
-              <a:rPr lang="en-US" dirty="0" err="1"/>
-              <a:t>Fastbin</a:t>
-            </a:r>
-            <a:r>
-              <a:rPr lang="en-US" dirty="0"/>
-              <a:t> (Very few Validations) </a:t>
-            </a:r>
-          </a:p>
-          <a:p>
-            <a:r>
-              <a:rPr lang="en-US" dirty="0"/>
-              <a:t>2.32+</a:t>
-            </a:r>
-          </a:p>
-          <a:p>
-            <a:pPr lvl="1"/>
-            <a:r>
-              <a:rPr lang="en-US" dirty="0"/>
-              <a:t>Pointer Mangling (later) </a:t>
-            </a:r>
-          </a:p>
-          <a:p>
-            <a:pPr lvl="1"/>
-            <a:r>
-              <a:rPr lang="en-US" dirty="0"/>
-              <a:t>Chunk alignment</a:t>
-            </a:r>
-          </a:p>
-        </p:txBody>
-      </p:sp>
-    </p:spTree>
-    <p:extLst>
-      <p:ext uri="{BB962C8B-B14F-4D97-AF65-F5344CB8AC3E}">
-        <p14:creationId xmlns:p14="http://schemas.microsoft.com/office/powerpoint/2010/main" val="1887160673"/>
-      </p:ext>
-    </p:extLst>
-  </p:cSld>
-  <p:clrMapOvr>
-    <a:masterClrMapping/>
-  </p:clrMapOvr>
-</p:sld>
-</file>
-
-<file path=ppt/slides/slide40.xml><?xml version="1.0" encoding="utf-8"?>
-<p:sld xmlns:a="http://schemas.openxmlformats.org/drawingml/2006/main" xmlns:r="http://schemas.openxmlformats.org/officeDocument/2006/relationships" xmlns:p="http://schemas.openxmlformats.org/presentationml/2006/main">
+<file path=ppt/slides/slide41.xml><?xml version="1.0" encoding="utf-8"?>
+<p:sld xmlns:a="http://schemas.openxmlformats.org/drawingml/2006/main" xmlns:r="http://schemas.openxmlformats.org/officeDocument/2006/relationships" xmlns:p="http://schemas.openxmlformats.org/presentationml/2006/main" show="0">
   <p:cSld>
     <p:spTree>
       <p:nvGrpSpPr>
@@ -25433,7 +25543,7 @@
 </p:sld>
 </file>
 
-<file path=ppt/slides/slide41.xml><?xml version="1.0" encoding="utf-8"?>
+<file path=ppt/slides/slide42.xml><?xml version="1.0" encoding="utf-8"?>
 <p:sld xmlns:a="http://schemas.openxmlformats.org/drawingml/2006/main" xmlns:r="http://schemas.openxmlformats.org/officeDocument/2006/relationships" xmlns:p="http://schemas.openxmlformats.org/presentationml/2006/main">
   <p:cSld>
     <p:spTree>
@@ -25569,8 +25679,8 @@
 </p:sld>
 </file>
 
-<file path=ppt/slides/slide42.xml><?xml version="1.0" encoding="utf-8"?>
-<p:sld xmlns:a="http://schemas.openxmlformats.org/drawingml/2006/main" xmlns:r="http://schemas.openxmlformats.org/officeDocument/2006/relationships" xmlns:p="http://schemas.openxmlformats.org/presentationml/2006/main">
+<file path=ppt/slides/slide43.xml><?xml version="1.0" encoding="utf-8"?>
+<p:sld xmlns:a="http://schemas.openxmlformats.org/drawingml/2006/main" xmlns:r="http://schemas.openxmlformats.org/officeDocument/2006/relationships" xmlns:p="http://schemas.openxmlformats.org/presentationml/2006/main" show="0">
   <p:cSld>
     <p:spTree>
       <p:nvGrpSpPr>
@@ -25679,15 +25789,7 @@
             </a:r>
             <a:r>
               <a:rPr lang="en-US" dirty="0"/>
-              <a:t>(</a:t>
-            </a:r>
-            <a:r>
-              <a:rPr lang="en-US" dirty="0" err="1"/>
-              <a:t>tcache</a:t>
-            </a:r>
-            <a:r>
-              <a:rPr lang="en-US" dirty="0"/>
-              <a:t>) </a:t>
+              <a:t>(TCache) </a:t>
             </a:r>
           </a:p>
           <a:p>
@@ -25726,7 +25828,7 @@
 </p:sld>
 </file>
 
-<file path=ppt/slides/slide43.xml><?xml version="1.0" encoding="utf-8"?>
+<file path=ppt/slides/slide44.xml><?xml version="1.0" encoding="utf-8"?>
 <p:sld xmlns:a="http://schemas.openxmlformats.org/drawingml/2006/main" xmlns:r="http://schemas.openxmlformats.org/officeDocument/2006/relationships" xmlns:p="http://schemas.openxmlformats.org/presentationml/2006/main">
   <p:cSld>
     <p:spTree>
@@ -25943,7 +26045,7 @@
 </p:sld>
 </file>
 
-<file path=ppt/slides/slide44.xml><?xml version="1.0" encoding="utf-8"?>
+<file path=ppt/slides/slide45.xml><?xml version="1.0" encoding="utf-8"?>
 <p:sld xmlns:a="http://schemas.openxmlformats.org/drawingml/2006/main" xmlns:r="http://schemas.openxmlformats.org/officeDocument/2006/relationships" xmlns:p="http://schemas.openxmlformats.org/presentationml/2006/main">
   <p:cSld>
     <p:spTree>
@@ -26148,268 +26250,8 @@
 </p:sld>
 </file>
 
-<file path=ppt/slides/slide45.xml><?xml version="1.0" encoding="utf-8"?>
-<p:sld xmlns:a="http://schemas.openxmlformats.org/drawingml/2006/main" xmlns:r="http://schemas.openxmlformats.org/officeDocument/2006/relationships" xmlns:p="http://schemas.openxmlformats.org/presentationml/2006/main">
-  <p:cSld>
-    <p:spTree>
-      <p:nvGrpSpPr>
-        <p:cNvPr id="1" name=""/>
-        <p:cNvGrpSpPr/>
-        <p:nvPr/>
-      </p:nvGrpSpPr>
-      <p:grpSpPr>
-        <a:xfrm>
-          <a:off x="0" y="0"/>
-          <a:ext cx="0" cy="0"/>
-          <a:chOff x="0" y="0"/>
-          <a:chExt cx="0" cy="0"/>
-        </a:xfrm>
-      </p:grpSpPr>
-      <p:sp>
-        <p:nvSpPr>
-          <p:cNvPr id="2" name="Title 1">
-            <a:extLst>
-              <a:ext uri="{FF2B5EF4-FFF2-40B4-BE49-F238E27FC236}">
-                <a16:creationId xmlns:a16="http://schemas.microsoft.com/office/drawing/2014/main" id="{52B723D6-E822-4046-AD71-79BF42520558}"/>
-              </a:ext>
-            </a:extLst>
-          </p:cNvPr>
-          <p:cNvSpPr>
-            <a:spLocks noGrp="1"/>
-          </p:cNvSpPr>
-          <p:nvPr>
-            <p:ph type="title"/>
-          </p:nvPr>
-        </p:nvSpPr>
-        <p:spPr/>
-        <p:txBody>
-          <a:bodyPr/>
-          <a:lstStyle/>
-          <a:p>
-            <a:r>
-              <a:rPr lang="en-US" dirty="0"/>
-              <a:t>Challenge!</a:t>
-            </a:r>
-          </a:p>
-        </p:txBody>
-      </p:sp>
-      <p:sp>
-        <p:nvSpPr>
-          <p:cNvPr id="3" name="Content Placeholder 2">
-            <a:extLst>
-              <a:ext uri="{FF2B5EF4-FFF2-40B4-BE49-F238E27FC236}">
-                <a16:creationId xmlns:a16="http://schemas.microsoft.com/office/drawing/2014/main" id="{9123A6E3-3C82-6944-9A25-201B953F4856}"/>
-              </a:ext>
-            </a:extLst>
-          </p:cNvPr>
-          <p:cNvSpPr>
-            <a:spLocks noGrp="1"/>
-          </p:cNvSpPr>
-          <p:nvPr>
-            <p:ph idx="1"/>
-          </p:nvPr>
-        </p:nvSpPr>
-        <p:spPr/>
-        <p:txBody>
-          <a:bodyPr/>
-          <a:lstStyle/>
-          <a:p>
-            <a:r>
-              <a:rPr lang="en-US" dirty="0"/>
-              <a:t>Same challenge, just on </a:t>
-            </a:r>
-            <a:r>
-              <a:rPr lang="en-US" dirty="0" err="1"/>
-              <a:t>GLibC</a:t>
-            </a:r>
-            <a:r>
-              <a:rPr lang="en-US" dirty="0"/>
-              <a:t> 2.23 (</a:t>
-            </a:r>
-            <a:r>
-              <a:rPr lang="en-US" dirty="0" err="1"/>
-              <a:t>fastbins</a:t>
-            </a:r>
-            <a:r>
-              <a:rPr lang="en-US" dirty="0"/>
-              <a:t> only) </a:t>
-            </a:r>
-          </a:p>
-          <a:p>
-            <a:r>
-              <a:rPr lang="en-US" dirty="0"/>
-              <a:t>Everything is the same, besides the </a:t>
-            </a:r>
-            <a:r>
-              <a:rPr lang="en-US" i="1" dirty="0"/>
-              <a:t>size</a:t>
-            </a:r>
-            <a:r>
-              <a:rPr lang="en-US" dirty="0"/>
-              <a:t> check:</a:t>
-            </a:r>
-          </a:p>
-          <a:p>
-            <a:pPr lvl="1"/>
-            <a:r>
-              <a:rPr lang="en-US" dirty="0"/>
-              <a:t>Add this to the </a:t>
-            </a:r>
-            <a:r>
-              <a:rPr lang="en-US" dirty="0" err="1"/>
-              <a:t>fastbin</a:t>
-            </a:r>
-            <a:r>
-              <a:rPr lang="en-US" dirty="0"/>
-              <a:t> POC to work with size check</a:t>
-            </a:r>
-          </a:p>
-          <a:p>
-            <a:r>
-              <a:rPr lang="en-US" dirty="0"/>
-              <a:t>Hints: </a:t>
-            </a:r>
-          </a:p>
-          <a:p>
-            <a:pPr lvl="1"/>
-            <a:r>
-              <a:rPr lang="en-US" dirty="0"/>
-              <a:t>Follow all of the chunks/allocations in GDB with heap commands</a:t>
-            </a:r>
-          </a:p>
-          <a:p>
-            <a:pPr lvl="1"/>
-            <a:r>
-              <a:rPr lang="en-US" dirty="0"/>
-              <a:t>Pauses and breakpoints are your friends! </a:t>
-            </a:r>
-          </a:p>
-        </p:txBody>
-      </p:sp>
-    </p:spTree>
-    <p:extLst>
-      <p:ext uri="{BB962C8B-B14F-4D97-AF65-F5344CB8AC3E}">
-        <p14:creationId xmlns:p14="http://schemas.microsoft.com/office/powerpoint/2010/main" val="374064228"/>
-      </p:ext>
-    </p:extLst>
-  </p:cSld>
-  <p:clrMapOvr>
-    <a:masterClrMapping/>
-  </p:clrMapOvr>
-</p:sld>
-</file>
-
 <file path=ppt/slides/slide46.xml><?xml version="1.0" encoding="utf-8"?>
-<p:sld xmlns:a="http://schemas.openxmlformats.org/drawingml/2006/main" xmlns:r="http://schemas.openxmlformats.org/officeDocument/2006/relationships" xmlns:p="http://schemas.openxmlformats.org/presentationml/2006/main">
-  <p:cSld>
-    <p:spTree>
-      <p:nvGrpSpPr>
-        <p:cNvPr id="1" name=""/>
-        <p:cNvGrpSpPr/>
-        <p:nvPr/>
-      </p:nvGrpSpPr>
-      <p:grpSpPr>
-        <a:xfrm>
-          <a:off x="0" y="0"/>
-          <a:ext cx="0" cy="0"/>
-          <a:chOff x="0" y="0"/>
-          <a:chExt cx="0" cy="0"/>
-        </a:xfrm>
-      </p:grpSpPr>
-      <p:sp>
-        <p:nvSpPr>
-          <p:cNvPr id="2" name="Title 1">
-            <a:extLst>
-              <a:ext uri="{FF2B5EF4-FFF2-40B4-BE49-F238E27FC236}">
-                <a16:creationId xmlns:a16="http://schemas.microsoft.com/office/drawing/2014/main" id="{49C5C544-7A79-4948-930E-3F325F194F9A}"/>
-              </a:ext>
-            </a:extLst>
-          </p:cNvPr>
-          <p:cNvSpPr>
-            <a:spLocks noGrp="1"/>
-          </p:cNvSpPr>
-          <p:nvPr>
-            <p:ph type="title"/>
-          </p:nvPr>
-        </p:nvSpPr>
-        <p:spPr/>
-        <p:txBody>
-          <a:bodyPr/>
-          <a:lstStyle/>
-          <a:p>
-            <a:r>
-              <a:rPr lang="en-US" dirty="0" err="1"/>
-              <a:t>Pwntools</a:t>
-            </a:r>
-            <a:r>
-              <a:rPr lang="en-US" dirty="0"/>
-              <a:t> (Packing)</a:t>
-            </a:r>
-          </a:p>
-        </p:txBody>
-      </p:sp>
-      <p:sp>
-        <p:nvSpPr>
-          <p:cNvPr id="3" name="Content Placeholder 2">
-            <a:extLst>
-              <a:ext uri="{FF2B5EF4-FFF2-40B4-BE49-F238E27FC236}">
-                <a16:creationId xmlns:a16="http://schemas.microsoft.com/office/drawing/2014/main" id="{6A51F9B0-6FAF-4541-BAD3-E3AA65ECBF2B}"/>
-              </a:ext>
-            </a:extLst>
-          </p:cNvPr>
-          <p:cNvSpPr>
-            <a:spLocks noGrp="1"/>
-          </p:cNvSpPr>
-          <p:nvPr>
-            <p:ph idx="1"/>
-          </p:nvPr>
-        </p:nvSpPr>
-        <p:spPr/>
-        <p:txBody>
-          <a:bodyPr/>
-          <a:lstStyle/>
-          <a:p>
-            <a:r>
-              <a:rPr lang="en-US" dirty="0"/>
-              <a:t>p64(address): </a:t>
-            </a:r>
-          </a:p>
-          <a:p>
-            <a:pPr lvl="1"/>
-            <a:r>
-              <a:rPr lang="en-US" dirty="0"/>
-              <a:t>Will put ‘expected’ value into memory</a:t>
-            </a:r>
-          </a:p>
-          <a:p>
-            <a:r>
-              <a:rPr lang="en-US" dirty="0"/>
-              <a:t>Changes the endianness (little vs. big) </a:t>
-            </a:r>
-          </a:p>
-          <a:p>
-            <a:r>
-              <a:rPr lang="en-US" dirty="0"/>
-              <a:t>Turns into ‘bytes’</a:t>
-            </a:r>
-          </a:p>
-        </p:txBody>
-      </p:sp>
-    </p:spTree>
-    <p:extLst>
-      <p:ext uri="{BB962C8B-B14F-4D97-AF65-F5344CB8AC3E}">
-        <p14:creationId xmlns:p14="http://schemas.microsoft.com/office/powerpoint/2010/main" val="134052906"/>
-      </p:ext>
-    </p:extLst>
-  </p:cSld>
-  <p:clrMapOvr>
-    <a:masterClrMapping/>
-  </p:clrMapOvr>
-</p:sld>
-</file>
-
-<file path=ppt/slides/slide47.xml><?xml version="1.0" encoding="utf-8"?>
-<p:sld xmlns:a="http://schemas.openxmlformats.org/drawingml/2006/main" xmlns:r="http://schemas.openxmlformats.org/officeDocument/2006/relationships" xmlns:p="http://schemas.openxmlformats.org/presentationml/2006/main">
+<p:sld xmlns:a="http://schemas.openxmlformats.org/drawingml/2006/main" xmlns:r="http://schemas.openxmlformats.org/officeDocument/2006/relationships" xmlns:p="http://schemas.openxmlformats.org/presentationml/2006/main" show="0">
   <p:cSld>
     <p:spTree>
       <p:nvGrpSpPr>
@@ -26590,8 +26432,8 @@
 </p:sld>
 </file>
 
-<file path=ppt/slides/slide48.xml><?xml version="1.0" encoding="utf-8"?>
-<p:sld xmlns:a="http://schemas.openxmlformats.org/drawingml/2006/main" xmlns:r="http://schemas.openxmlformats.org/officeDocument/2006/relationships" xmlns:p="http://schemas.openxmlformats.org/presentationml/2006/main">
+<file path=ppt/slides/slide47.xml><?xml version="1.0" encoding="utf-8"?>
+<p:sld xmlns:a="http://schemas.openxmlformats.org/drawingml/2006/main" xmlns:r="http://schemas.openxmlformats.org/officeDocument/2006/relationships" xmlns:p="http://schemas.openxmlformats.org/presentationml/2006/main" show="0">
   <p:cSld>
     <p:spTree>
       <p:nvGrpSpPr>
@@ -26774,8 +26616,8 @@
 </p:sld>
 </file>
 
-<file path=ppt/slides/slide49.xml><?xml version="1.0" encoding="utf-8"?>
-<p:sld xmlns:a="http://schemas.openxmlformats.org/drawingml/2006/main" xmlns:r="http://schemas.openxmlformats.org/officeDocument/2006/relationships" xmlns:p="http://schemas.openxmlformats.org/presentationml/2006/main">
+<file path=ppt/slides/slide48.xml><?xml version="1.0" encoding="utf-8"?>
+<p:sld xmlns:a="http://schemas.openxmlformats.org/drawingml/2006/main" xmlns:r="http://schemas.openxmlformats.org/officeDocument/2006/relationships" xmlns:p="http://schemas.openxmlformats.org/presentationml/2006/main" show="0">
   <p:cSld>
     <p:spTree>
       <p:nvGrpSpPr>
@@ -27229,6 +27071,151 @@
 </p:sld>
 </file>
 
+<file path=ppt/slides/slide49.xml><?xml version="1.0" encoding="utf-8"?>
+<p:sld xmlns:a="http://schemas.openxmlformats.org/drawingml/2006/main" xmlns:r="http://schemas.openxmlformats.org/officeDocument/2006/relationships" xmlns:p="http://schemas.openxmlformats.org/presentationml/2006/main">
+  <p:cSld>
+    <p:spTree>
+      <p:nvGrpSpPr>
+        <p:cNvPr id="1" name=""/>
+        <p:cNvGrpSpPr/>
+        <p:nvPr/>
+      </p:nvGrpSpPr>
+      <p:grpSpPr>
+        <a:xfrm>
+          <a:off x="0" y="0"/>
+          <a:ext cx="0" cy="0"/>
+          <a:chOff x="0" y="0"/>
+          <a:chExt cx="0" cy="0"/>
+        </a:xfrm>
+      </p:grpSpPr>
+      <p:sp>
+        <p:nvSpPr>
+          <p:cNvPr id="2" name="Title 1">
+            <a:extLst>
+              <a:ext uri="{FF2B5EF4-FFF2-40B4-BE49-F238E27FC236}">
+                <a16:creationId xmlns:a16="http://schemas.microsoft.com/office/drawing/2014/main" id="{D28FA83E-A3F8-2449-9F4C-22F2D1A67F19}"/>
+              </a:ext>
+            </a:extLst>
+          </p:cNvPr>
+          <p:cNvSpPr>
+            <a:spLocks noGrp="1"/>
+          </p:cNvSpPr>
+          <p:nvPr>
+            <p:ph type="title"/>
+          </p:nvPr>
+        </p:nvSpPr>
+        <p:spPr/>
+        <p:txBody>
+          <a:bodyPr/>
+          <a:lstStyle/>
+          <a:p>
+            <a:r>
+              <a:rPr lang="en-US" dirty="0"/>
+              <a:t>Double Free TCache Bypasses</a:t>
+            </a:r>
+          </a:p>
+        </p:txBody>
+      </p:sp>
+      <p:sp>
+        <p:nvSpPr>
+          <p:cNvPr id="3" name="Content Placeholder 2">
+            <a:extLst>
+              <a:ext uri="{FF2B5EF4-FFF2-40B4-BE49-F238E27FC236}">
+                <a16:creationId xmlns:a16="http://schemas.microsoft.com/office/drawing/2014/main" id="{B7CABB4F-3E41-3C4D-8694-2F7B9837E18F}"/>
+              </a:ext>
+            </a:extLst>
+          </p:cNvPr>
+          <p:cNvSpPr>
+            <a:spLocks noGrp="1"/>
+          </p:cNvSpPr>
+          <p:nvPr>
+            <p:ph idx="1"/>
+          </p:nvPr>
+        </p:nvSpPr>
+        <p:spPr/>
+        <p:txBody>
+          <a:bodyPr/>
+          <a:lstStyle/>
+          <a:p>
+            <a:r>
+              <a:rPr lang="en-US" dirty="0"/>
+              <a:t>2.26-2.28 - NO double free checks</a:t>
+            </a:r>
+          </a:p>
+          <a:p>
+            <a:r>
+              <a:rPr lang="en-US" dirty="0"/>
+              <a:t>2.29+ - House of </a:t>
+            </a:r>
+            <a:r>
+              <a:rPr lang="en-US" dirty="0" err="1"/>
+              <a:t>Botcake</a:t>
+            </a:r>
+            <a:r>
+              <a:rPr lang="en-US" dirty="0"/>
+              <a:t>: </a:t>
+            </a:r>
+          </a:p>
+          <a:p>
+            <a:pPr lvl="1"/>
+            <a:r>
+              <a:rPr lang="en-US" dirty="0"/>
+              <a:t>Fill </a:t>
+            </a:r>
+            <a:r>
+              <a:rPr lang="en-US" dirty="0" err="1"/>
+              <a:t>Tcache</a:t>
+            </a:r>
+            <a:r>
+              <a:rPr lang="en-US" dirty="0"/>
+              <a:t> (7 chunks) with chunks larger than </a:t>
+            </a:r>
+            <a:r>
+              <a:rPr lang="en-US" dirty="0" err="1"/>
+              <a:t>fastbin</a:t>
+            </a:r>
+            <a:endParaRPr lang="en-US" dirty="0"/>
+          </a:p>
+          <a:p>
+            <a:pPr lvl="1"/>
+            <a:r>
+              <a:rPr lang="en-US" dirty="0"/>
+              <a:t>Unsorted bin (1 chunk) of same size</a:t>
+            </a:r>
+          </a:p>
+          <a:p>
+            <a:pPr lvl="1"/>
+            <a:r>
+              <a:rPr lang="en-US" dirty="0"/>
+              <a:t>Allocate chunk from TCache of same size</a:t>
+            </a:r>
+          </a:p>
+          <a:p>
+            <a:pPr lvl="1"/>
+            <a:r>
+              <a:rPr lang="en-US" dirty="0"/>
+              <a:t>Free Unsorted bin chunk again</a:t>
+            </a:r>
+          </a:p>
+          <a:p>
+            <a:pPr lvl="1"/>
+            <a:endParaRPr lang="en-US" dirty="0"/>
+          </a:p>
+        </p:txBody>
+      </p:sp>
+    </p:spTree>
+    <p:extLst>
+      <p:ext uri="{BB962C8B-B14F-4D97-AF65-F5344CB8AC3E}">
+        <p14:creationId xmlns:p14="http://schemas.microsoft.com/office/powerpoint/2010/main" val="298139872"/>
+      </p:ext>
+    </p:extLst>
+  </p:cSld>
+  <p:clrMapOvr>
+    <a:masterClrMapping/>
+  </p:clrMapOvr>
+</p:sld>
+</file>
+
 <file path=ppt/slides/slide5.xml><?xml version="1.0" encoding="utf-8"?>
 <p:sld xmlns:a="http://schemas.openxmlformats.org/drawingml/2006/main" xmlns:r="http://schemas.openxmlformats.org/officeDocument/2006/relationships" xmlns:p="http://schemas.openxmlformats.org/presentationml/2006/main">
   <p:cSld>
@@ -27298,7 +27285,7 @@
         </p:spPr>
         <p:txBody>
           <a:bodyPr>
-            <a:normAutofit/>
+            <a:normAutofit lnSpcReduction="10000"/>
           </a:bodyPr>
           <a:lstStyle/>
           <a:p>
@@ -27342,7 +27329,7 @@
             <a:pPr lvl="1"/>
             <a:r>
               <a:rPr lang="en-US" dirty="0"/>
-              <a:t>Each thread has 64 singly-linked TCache bins. </a:t>
+              <a:t>Each thread has 64 singly-linked TCache bins in 0x10 increasing sizes.</a:t>
             </a:r>
           </a:p>
           <a:p>
@@ -27356,7 +27343,7 @@
             <a:pPr lvl="1"/>
             <a:r>
               <a:rPr lang="en-US" dirty="0"/>
-              <a:t>0x20 is smallest bin size</a:t>
+              <a:t>FIFO chunks</a:t>
             </a:r>
           </a:p>
           <a:p>
@@ -27430,14 +27417,14 @@
             </a:r>
             <a:r>
               <a:rPr lang="en-US" dirty="0"/>
-              <a:t> Dup/Double Free Bypasses</a:t>
+              <a:t> Dup - Double Free Bypasses</a:t>
             </a:r>
           </a:p>
         </p:txBody>
       </p:sp>
       <p:sp>
         <p:nvSpPr>
-          <p:cNvPr id="3" name="Content Placeholder 2">
+          <p:cNvPr id="3" name="Content Placeholder 2" descr="Double free fastbin bypass">
             <a:extLst>
               <a:ext uri="{FF2B5EF4-FFF2-40B4-BE49-F238E27FC236}">
                 <a16:creationId xmlns:a16="http://schemas.microsoft.com/office/drawing/2014/main" id="{33794FC9-3BB9-9043-9765-4953EF3F9116}"/>
@@ -27465,14 +27452,126 @@
             <a:pPr lvl="1"/>
             <a:r>
               <a:rPr lang="en-US" dirty="0"/>
-              <a:t>A -&gt; B -&gt; A </a:t>
-            </a:r>
-          </a:p>
-          <a:p>
-            <a:pPr lvl="1"/>
+              <a:t>A -&gt; B -&gt; A (shown below)</a:t>
+            </a:r>
+          </a:p>
+          <a:p>
             <a:r>
               <a:rPr lang="en-US" dirty="0"/>
-              <a:t>This works</a:t>
+              <a:t>Unsorted bin &amp; </a:t>
+            </a:r>
+            <a:r>
+              <a:rPr lang="en-US" dirty="0" err="1"/>
+              <a:t>Fastbin</a:t>
+            </a:r>
+            <a:r>
+              <a:rPr lang="en-US" dirty="0"/>
+              <a:t> at the same time</a:t>
+            </a:r>
+          </a:p>
+          <a:p>
+            <a:endParaRPr lang="en-US" dirty="0"/>
+          </a:p>
+          <a:p>
+            <a:endParaRPr lang="en-US" dirty="0"/>
+          </a:p>
+        </p:txBody>
+      </p:sp>
+      <p:pic>
+        <p:nvPicPr>
+          <p:cNvPr id="5" name="Picture 4">
+            <a:extLst>
+              <a:ext uri="{FF2B5EF4-FFF2-40B4-BE49-F238E27FC236}">
+                <a16:creationId xmlns:a16="http://schemas.microsoft.com/office/drawing/2014/main" id="{78797D93-943F-774B-BCBB-233346B3B3EA}"/>
+              </a:ext>
+            </a:extLst>
+          </p:cNvPr>
+          <p:cNvPicPr>
+            <a:picLocks noChangeAspect="1"/>
+          </p:cNvPicPr>
+          <p:nvPr/>
+        </p:nvPicPr>
+        <p:blipFill>
+          <a:blip r:embed="rId2"/>
+          <a:stretch>
+            <a:fillRect/>
+          </a:stretch>
+        </p:blipFill>
+        <p:spPr>
+          <a:xfrm>
+            <a:off x="248027" y="2917371"/>
+            <a:ext cx="4323973" cy="1449803"/>
+          </a:xfrm>
+          <a:prstGeom prst="rect">
+            <a:avLst/>
+          </a:prstGeom>
+        </p:spPr>
+      </p:pic>
+      <p:pic>
+        <p:nvPicPr>
+          <p:cNvPr id="7" name="Picture 6" descr="A picture containing text, clock, sign&#10;&#10;Description automatically generated">
+            <a:extLst>
+              <a:ext uri="{FF2B5EF4-FFF2-40B4-BE49-F238E27FC236}">
+                <a16:creationId xmlns:a16="http://schemas.microsoft.com/office/drawing/2014/main" id="{94A23721-CCA0-364D-8C2D-945C034E9C38}"/>
+              </a:ext>
+            </a:extLst>
+          </p:cNvPr>
+          <p:cNvPicPr>
+            <a:picLocks noChangeAspect="1"/>
+          </p:cNvPicPr>
+          <p:nvPr/>
+        </p:nvPicPr>
+        <p:blipFill>
+          <a:blip r:embed="rId3"/>
+          <a:stretch>
+            <a:fillRect/>
+          </a:stretch>
+        </p:blipFill>
+        <p:spPr>
+          <a:xfrm>
+            <a:off x="5318109" y="2631529"/>
+            <a:ext cx="3197241" cy="1735645"/>
+          </a:xfrm>
+          <a:prstGeom prst="rect">
+            <a:avLst/>
+          </a:prstGeom>
+        </p:spPr>
+      </p:pic>
+      <p:sp>
+        <p:nvSpPr>
+          <p:cNvPr id="8" name="TextBox 7">
+            <a:extLst>
+              <a:ext uri="{FF2B5EF4-FFF2-40B4-BE49-F238E27FC236}">
+                <a16:creationId xmlns:a16="http://schemas.microsoft.com/office/drawing/2014/main" id="{580B2E26-80E2-D44D-B754-C2DC62A5B5FC}"/>
+              </a:ext>
+            </a:extLst>
+          </p:cNvPr>
+          <p:cNvSpPr txBox="1"/>
+          <p:nvPr/>
+        </p:nvSpPr>
+        <p:spPr>
+          <a:xfrm>
+            <a:off x="7382859" y="2498658"/>
+            <a:ext cx="1513114" cy="584775"/>
+          </a:xfrm>
+          <a:prstGeom prst="rect">
+            <a:avLst/>
+          </a:prstGeom>
+          <a:noFill/>
+        </p:spPr>
+        <p:txBody>
+          <a:bodyPr wrap="square" rtlCol="0">
+            <a:spAutoFit/>
+          </a:bodyPr>
+          <a:lstStyle/>
+          <a:p>
+            <a:r>
+              <a:rPr lang="en-US" sz="3200" dirty="0">
+                <a:solidFill>
+                  <a:srgbClr val="FF0000"/>
+                </a:solidFill>
+              </a:rPr>
+              <a:t>CRASH</a:t>
             </a:r>
           </a:p>
         </p:txBody>
@@ -28290,7 +28389,7 @@
             </a:r>
             <a:r>
               <a:rPr lang="en-US" dirty="0"/>
-              <a:t> 2.30 though:</a:t>
+              <a:t> 2.28 though:</a:t>
             </a:r>
           </a:p>
           <a:p>

</xml_diff>